<commit_message>
Work for the evening of 2023-0110: Continued preparation for tomorrow's presentation...
</commit_message>
<xml_diff>
--- a/results/2022-1201/notebook/KA.2023-0111.presentation.pptx
+++ b/results/2022-1201/notebook/KA.2023-0111.presentation.pptx
@@ -5,7 +5,7 @@
     <p:sldMasterId id="2147483648" r:id="rId1"/>
   </p:sldMasterIdLst>
   <p:notesMasterIdLst>
-    <p:notesMasterId r:id="rId10"/>
+    <p:notesMasterId r:id="rId11"/>
   </p:notesMasterIdLst>
   <p:sldIdLst>
     <p:sldId id="256" r:id="rId2"/>
@@ -14,8 +14,9 @@
     <p:sldId id="261" r:id="rId5"/>
     <p:sldId id="263" r:id="rId6"/>
     <p:sldId id="262" r:id="rId7"/>
-    <p:sldId id="258" r:id="rId8"/>
-    <p:sldId id="259" r:id="rId9"/>
+    <p:sldId id="264" r:id="rId8"/>
+    <p:sldId id="258" r:id="rId9"/>
+    <p:sldId id="259" r:id="rId10"/>
   </p:sldIdLst>
   <p:sldSz cx="12192000" cy="6858000"/>
   <p:notesSz cx="6858000" cy="9144000"/>
@@ -114,6 +115,11 @@
       </a:defRPr>
     </a:lvl9pPr>
   </p:defaultTextStyle>
+  <p:extLst>
+    <p:ext uri="{EFAFB233-063F-42B5-8137-9DF3F51BA10A}">
+      <p15:sldGuideLst xmlns:p15="http://schemas.microsoft.com/office/powerpoint/2012/main"/>
+    </p:ext>
+  </p:extLst>
 </p:presentation>
 </file>
 
@@ -511,6 +517,18 @@
           <a:lstStyle/>
           <a:p>
             <a:r>
+              <a:rPr lang="en-US" b="0" i="0" u="sng" dirty="0">
+                <a:solidFill>
+                  <a:srgbClr val="24292F"/>
+                </a:solidFill>
+                <a:effectLst/>
+                <a:latin typeface="-apple-system"/>
+              </a:rPr>
+              <a:t>On Trinity genome-guided mode</a:t>
+            </a:r>
+          </a:p>
+          <a:p>
+            <a:r>
               <a:rPr lang="en-US" b="0" i="0" dirty="0">
                 <a:solidFill>
                   <a:srgbClr val="24292F"/>
@@ -538,29 +556,136 @@
                 <a:effectLst/>
                 <a:latin typeface="-apple-system"/>
               </a:rPr>
-              <a:t> typical genome-guided approaches (</a:t>
-            </a:r>
-            <a:r>
-              <a:rPr lang="en-US" b="0" i="0" dirty="0" err="1">
-                <a:solidFill>
-                  <a:srgbClr val="24292F"/>
-                </a:solidFill>
-                <a:effectLst/>
-                <a:latin typeface="-apple-system"/>
-              </a:rPr>
-              <a:t>eg.</a:t>
-            </a:r>
-            <a:r>
-              <a:rPr lang="en-US" b="0" i="0" dirty="0">
-                <a:solidFill>
-                  <a:srgbClr val="24292F"/>
-                </a:solidFill>
-                <a:effectLst/>
-                <a:latin typeface="-apple-system"/>
-              </a:rPr>
-              <a:t> cufflinks) where aligned reads are stitched into transcript structures and where transcript sequences are reconstructed based on the reference genome sequence. Here, transcripts are reconstructed based on the actual read sequences.</a:t>
-            </a:r>
+              <a:t> typical genome-guided approaches (e.g., Cufflinks) where aligned reads are stitched into transcript structures and where transcript sequences are reconstructed based on the reference genome sequence. Here, transcripts are reconstructed based on the actual read sequences.</a:t>
+            </a:r>
+          </a:p>
+          <a:p>
+            <a:endParaRPr lang="en-US" b="0" i="0" dirty="0">
+              <a:solidFill>
+                <a:srgbClr val="24292F"/>
+              </a:solidFill>
+              <a:effectLst/>
+              <a:latin typeface="-apple-system"/>
+            </a:endParaRPr>
+          </a:p>
+          <a:p>
+            <a:r>
+              <a:rPr lang="en-US" u="sng" dirty="0"/>
+              <a:t>Transcript reconstruction from RNA-Seq and incorporation into gene annotations</a:t>
+            </a:r>
+          </a:p>
+          <a:p>
+            <a:r>
+              <a:rPr lang="en-US" dirty="0"/>
+              <a:t>¶1</a:t>
+            </a:r>
+          </a:p>
+          <a:p>
+            <a:r>
+              <a:rPr lang="en-US" dirty="0"/>
+              <a:t>Transcript reconstruction from RNA-Seq reads was performed using a hybrid approach leveraging genome alignments coupled with de novo RNA-Seq read assembly. RNA-Seq reads were first aligned to genome sequences using </a:t>
+            </a:r>
+            <a:r>
+              <a:rPr lang="en-US" dirty="0" err="1"/>
+              <a:t>TopHat</a:t>
+            </a:r>
+            <a:r>
+              <a:rPr lang="en-US" dirty="0"/>
+              <a:t> (73) requiring a minimum intron length of 25 bases and a maximum intron length of 1 kb. Unmapped reads were identified and realigned to the genome using the more sensitive BLAT (74) alignment tool. Based on genome alignment coordinates and strand-specificity, reads were partitioned into disjoint strand-specific ‘coverage regions’, and neighboring coverage regions within 1 kb were merged into larger regions. The reads corresponding to alignments in the merged coverage regions were subjected to de novo assembly as part of the transcript reconstruction process described below.</a:t>
+            </a:r>
+          </a:p>
+          <a:p>
             <a:endParaRPr lang="en-US" dirty="0"/>
+          </a:p>
+          <a:p>
+            <a:r>
+              <a:rPr lang="en-US" dirty="0"/>
+              <a:t>¶2</a:t>
+            </a:r>
+          </a:p>
+          <a:p>
+            <a:r>
+              <a:rPr lang="en-US" dirty="0"/>
+              <a:t>Prior to de novo assembly, operations were performed to mitigate the errant fusion of adjacent and minimally overlapping transcripts by considering the evidence for transcription contiguity based on read pairing support. A pair contiguity sensor was devised as follows: A 200 base window was slid across each covered region with a step size of 33 bases. The RNA-Seq fragments (defined by either read of pairs derived from single fragments) overlapping the first 50 bases (segment A) and the last 50 bases (segment B) of the 200 base window were identified as fragment sets (A, B). The contiguity of fragment coverage was computed as a Jaccard similarity coefficient: (AB)/(AB). Similarity coefficient values at or below 0.05 trigger a search for a covered region clip point. First, the smallest coefficient value within 100 bases is defined as a candidate clip point. If regions of greater transcript read pair contiguity exist within 300 bases of both sides of the candidate clip point, the covered region is clipped at the candidate site, partitioning the reads into disjoint read sets and ultimately precluding the co-assembly of reads that are divided by the dissection.  Read sequences corresponding to alignments within the resulting disjoint coverage regions were de novo assembled using the Inchworm RNA-Seq assembly tool (http://</a:t>
+            </a:r>
+            <a:r>
+              <a:rPr lang="en-US" dirty="0" err="1"/>
+              <a:t>inchworm.sourceforge.net</a:t>
+            </a:r>
+            <a:r>
+              <a:rPr lang="en-US" dirty="0"/>
+              <a:t>/), using a k-</a:t>
+            </a:r>
+            <a:r>
+              <a:rPr lang="en-US" dirty="0" err="1"/>
+              <a:t>mer</a:t>
+            </a:r>
+            <a:r>
+              <a:rPr lang="en-US" dirty="0"/>
+              <a:t> length of 25 and requiring a minimum contig length of 100 bases.</a:t>
+            </a:r>
+          </a:p>
+          <a:p>
+            <a:endParaRPr lang="en-US" dirty="0"/>
+          </a:p>
+          <a:p>
+            <a:r>
+              <a:rPr lang="en-US" dirty="0"/>
+              <a:t>¶3</a:t>
+            </a:r>
+          </a:p>
+          <a:p>
+            <a:r>
+              <a:rPr lang="en-US" dirty="0"/>
+              <a:t>We enhanced the PASA annotation pipeline (75) to leverage RNA-Seq for transcript reconstruction and genome annotation by leveraging strand-specific Inchworm RNA-Seq assemblies similarly to expressed sequence tags (ESTs) as follows. Inchworm-assembled transcript sequences were aligned to the genome using GMAP (76), reporting only the single best-scoring alignment for each transcript.</a:t>
+            </a:r>
+          </a:p>
+          <a:p>
+            <a:endParaRPr lang="en-US" dirty="0"/>
+          </a:p>
+          <a:p>
+            <a:r>
+              <a:rPr lang="en-US" dirty="0"/>
+              <a:t>¶4</a:t>
+            </a:r>
+          </a:p>
+          <a:p>
+            <a:r>
+              <a:rPr lang="en-US" dirty="0"/>
+              <a:t>Valid transcript alignments were required to align to the genome across at least 90% of their length and with at least 95% sequence identity. Spliced transcript alignments were required to include consensus (GT-AG, GC-AG, AT-AC) dinucleotide splice pairs at intron boundaries. The read-derived k-</a:t>
+            </a:r>
+            <a:r>
+              <a:rPr lang="en-US" dirty="0" err="1"/>
+              <a:t>mer</a:t>
+            </a:r>
+            <a:r>
+              <a:rPr lang="en-US" dirty="0"/>
+              <a:t> coverage of each inchworm-assembled transcript (a proxy for transcript expression) exists as an attribute of each sequence, incorporated into the accession of the </a:t>
+            </a:r>
+            <a:r>
+              <a:rPr lang="en-US" dirty="0" err="1"/>
+              <a:t>fasta</a:t>
+            </a:r>
+            <a:r>
+              <a:rPr lang="en-US" dirty="0"/>
+              <a:t>-formatted Inchworm-assembled transcript. The PASA pipeline piles the inchworm transcripts along each strand of the genome with pile height prioritized by the k-</a:t>
+            </a:r>
+            <a:r>
+              <a:rPr lang="en-US" dirty="0" err="1"/>
+              <a:t>mer</a:t>
+            </a:r>
+            <a:r>
+              <a:rPr lang="en-US" dirty="0"/>
+              <a:t> coverage value, adding transcripts with greater coverage (expression) to piles first. Tentative RNA-Seq assembly artifacts, corresponding to transcripts with &gt;= 30% overlap (by shortest length) of a dominant (prioritized) transcript and at most 10% the k-</a:t>
+            </a:r>
+            <a:r>
+              <a:rPr lang="en-US" dirty="0" err="1"/>
+              <a:t>mer</a:t>
+            </a:r>
+            <a:r>
+              <a:rPr lang="en-US" dirty="0"/>
+              <a:t> coverage of the dominant transcript were discarded. Remaining valid Inchworm-generated transcript alignments were treated identically to EST alignments in the PASA pipeline and integrated into gene annotations as previously described (75).</a:t>
+            </a:r>
           </a:p>
         </p:txBody>
       </p:sp>
@@ -3931,7 +4056,26 @@
                 <a:effectLst/>
                 <a:latin typeface="Helvetica Neue" panose="02000503000000020004" pitchFamily="2" charset="0"/>
               </a:rPr>
-              <a:t>This work necessitates the creation of a new transcriptome assembly built from the 4tU-seq data—but </a:t>
+              <a:t>This work necessitates the creation of a new transcriptome assembly built from the 4tU-seq</a:t>
+            </a:r>
+            <a:br>
+              <a:rPr lang="en-US" sz="2200" b="0" i="0" dirty="0">
+                <a:solidFill>
+                  <a:srgbClr val="737373"/>
+                </a:solidFill>
+                <a:effectLst/>
+                <a:latin typeface="Helvetica Neue" panose="02000503000000020004" pitchFamily="2" charset="0"/>
+              </a:rPr>
+            </a:br>
+            <a:r>
+              <a:rPr lang="en-US" sz="2200" b="0" i="0" dirty="0">
+                <a:solidFill>
+                  <a:srgbClr val="737373"/>
+                </a:solidFill>
+                <a:effectLst/>
+                <a:latin typeface="Helvetica Neue" panose="02000503000000020004" pitchFamily="2" charset="0"/>
+              </a:rPr>
+              <a:t> data—but </a:t>
             </a:r>
             <a:r>
               <a:rPr lang="en-US" sz="2200" b="1" i="1" dirty="0">
@@ -4345,7 +4489,7 @@
         <p:spPr>
           <a:xfrm>
             <a:off x="-1" y="794657"/>
-            <a:ext cx="7239001" cy="5159829"/>
+            <a:ext cx="7239001" cy="6056415"/>
           </a:xfrm>
         </p:spPr>
         <p:txBody>
@@ -4364,7 +4508,7 @@
                 <a:latin typeface="Arial" panose="020B0604020202020204" pitchFamily="34" charset="0"/>
                 <a:cs typeface="Arial" panose="020B0604020202020204" pitchFamily="34" charset="0"/>
               </a:rPr>
-              <a:t>In transcriptome assembly, millions of "short" reads are pieced together to match or closely resemble their genomic sequences of origin: These are the </a:t>
+              <a:t>In transcriptome assembly, millions of "short" reads are pieced together to accurately represent their genomic sequences of origin: These are the </a:t>
             </a:r>
             <a:r>
               <a:rPr lang="en-US" sz="2000" b="1" i="1" dirty="0">
@@ -4373,6 +4517,20 @@
                 <a:cs typeface="Arial" panose="020B0604020202020204" pitchFamily="34" charset="0"/>
               </a:rPr>
               <a:t>assembled transcripts</a:t>
+            </a:r>
+            <a:endParaRPr lang="en-US" sz="2000" dirty="0">
+              <a:effectLst/>
+              <a:latin typeface="Arial" panose="020B0604020202020204" pitchFamily="34" charset="0"/>
+              <a:cs typeface="Arial" panose="020B0604020202020204" pitchFamily="34" charset="0"/>
+            </a:endParaRPr>
+          </a:p>
+          <a:p>
+            <a:r>
+              <a:rPr lang="en-US" sz="2000" dirty="0">
+                <a:latin typeface="Arial" panose="020B0604020202020204" pitchFamily="34" charset="0"/>
+                <a:cs typeface="Arial" panose="020B0604020202020204" pitchFamily="34" charset="0"/>
+              </a:rPr>
+              <a:t>This is achieved by examining overlaps between reads—or subsequences thereof—in order to concatenate them into longer contiguous sequences (a.k.a., contigs) [15, 56]</a:t>
             </a:r>
             <a:endParaRPr lang="en-US" sz="2000" b="0" i="0" dirty="0">
               <a:effectLst/>
@@ -4391,66 +4549,21 @@
                 <a:latin typeface="Arial" panose="020B0604020202020204" pitchFamily="34" charset="0"/>
                 <a:cs typeface="Arial" panose="020B0604020202020204" pitchFamily="34" charset="0"/>
               </a:rPr>
-              <a:t>In general, reads can be assembled through either </a:t>
-            </a:r>
-            <a:r>
-              <a:rPr lang="en-US" sz="2000" b="1" i="0" dirty="0">
-                <a:effectLst/>
-                <a:latin typeface="Arial" panose="020B0604020202020204" pitchFamily="34" charset="0"/>
-                <a:cs typeface="Arial" panose="020B0604020202020204" pitchFamily="34" charset="0"/>
-              </a:rPr>
-              <a:t>(a)</a:t>
-            </a:r>
-            <a:r>
-              <a:rPr lang="en-US" sz="2000" b="0" i="0" dirty="0">
-                <a:effectLst/>
-                <a:latin typeface="Arial" panose="020B0604020202020204" pitchFamily="34" charset="0"/>
-                <a:cs typeface="Arial" panose="020B0604020202020204" pitchFamily="34" charset="0"/>
-              </a:rPr>
-              <a:t> reference genome-guided or </a:t>
-            </a:r>
-            <a:r>
-              <a:rPr lang="en-US" sz="2000" b="1" i="0" dirty="0">
-                <a:effectLst/>
-                <a:latin typeface="Arial" panose="020B0604020202020204" pitchFamily="34" charset="0"/>
-                <a:cs typeface="Arial" panose="020B0604020202020204" pitchFamily="34" charset="0"/>
-              </a:rPr>
-              <a:t>(b)</a:t>
-            </a:r>
-            <a:r>
-              <a:rPr lang="en-US" sz="2000" b="0" i="0" dirty="0">
-                <a:effectLst/>
-                <a:latin typeface="Arial" panose="020B0604020202020204" pitchFamily="34" charset="0"/>
-                <a:cs typeface="Arial" panose="020B0604020202020204" pitchFamily="34" charset="0"/>
-              </a:rPr>
-              <a:t> </a:t>
-            </a:r>
-            <a:r>
-              <a:rPr lang="en-US" sz="2000" b="0" i="1" dirty="0">
-                <a:effectLst/>
-                <a:latin typeface="Arial" panose="020B0604020202020204" pitchFamily="34" charset="0"/>
-                <a:cs typeface="Arial" panose="020B0604020202020204" pitchFamily="34" charset="0"/>
-              </a:rPr>
-              <a:t>de novo</a:t>
-            </a:r>
-            <a:r>
-              <a:rPr lang="en-US" sz="2000" b="0" i="0" dirty="0">
-                <a:effectLst/>
-                <a:latin typeface="Arial" panose="020B0604020202020204" pitchFamily="34" charset="0"/>
-                <a:cs typeface="Arial" panose="020B0604020202020204" pitchFamily="34" charset="0"/>
-              </a:rPr>
-              <a:t>—a.k.a., genome-free—approaches</a:t>
-            </a:r>
-          </a:p>
-          <a:p>
-            <a:pPr lvl="1"/>
+              <a:t>In general, reads can be assembled through one of two approaches:</a:t>
+            </a:r>
+          </a:p>
+          <a:p>
+            <a:pPr marL="800100" lvl="1" indent="-342900">
+              <a:buFont typeface="+mj-lt"/>
+              <a:buAutoNum type="alphaLcParenR"/>
+            </a:pPr>
             <a:r>
               <a:rPr lang="en-US" sz="1600" b="0" i="0" dirty="0">
                 <a:effectLst/>
                 <a:latin typeface="Arial" panose="020B0604020202020204" pitchFamily="34" charset="0"/>
                 <a:cs typeface="Arial" panose="020B0604020202020204" pitchFamily="34" charset="0"/>
               </a:rPr>
-              <a:t>In the </a:t>
+              <a:t>reference </a:t>
             </a:r>
             <a:r>
               <a:rPr lang="en-US" sz="1600" b="1" i="0" dirty="0">
@@ -4461,39 +4574,69 @@
               <a:t>genome-guided approach</a:t>
             </a:r>
             <a:r>
+              <a:rPr lang="en-US" sz="1600" dirty="0">
+                <a:latin typeface="Arial" panose="020B0604020202020204" pitchFamily="34" charset="0"/>
+                <a:cs typeface="Arial" panose="020B0604020202020204" pitchFamily="34" charset="0"/>
+              </a:rPr>
+              <a:t>: </a:t>
+            </a:r>
+            <a:r>
               <a:rPr lang="en-US" sz="1600" b="0" i="0" dirty="0">
                 <a:effectLst/>
                 <a:latin typeface="Arial" panose="020B0604020202020204" pitchFamily="34" charset="0"/>
                 <a:cs typeface="Arial" panose="020B0604020202020204" pitchFamily="34" charset="0"/>
               </a:rPr>
-              <a:t>, transcriptome assembly occurs through the alignment of reads to the reference genome</a:t>
-            </a:r>
-          </a:p>
-          <a:p>
-            <a:pPr lvl="1"/>
+              <a:t>Assembly occurs through the alignment of reads to the reference genome</a:t>
+            </a:r>
+          </a:p>
+          <a:p>
+            <a:pPr marL="800100" lvl="1" indent="-342900">
+              <a:buFont typeface="+mj-lt"/>
+              <a:buAutoNum type="alphaLcParenR"/>
+            </a:pPr>
+            <a:r>
+              <a:rPr lang="en-US" sz="1600" b="1" dirty="0">
+                <a:latin typeface="Arial" panose="020B0604020202020204" pitchFamily="34" charset="0"/>
+                <a:cs typeface="Arial" panose="020B0604020202020204" pitchFamily="34" charset="0"/>
+              </a:rPr>
+              <a:t>genome-free</a:t>
+            </a:r>
+            <a:r>
+              <a:rPr lang="en-US" sz="1600" dirty="0">
+                <a:latin typeface="Arial" panose="020B0604020202020204" pitchFamily="34" charset="0"/>
+                <a:cs typeface="Arial" panose="020B0604020202020204" pitchFamily="34" charset="0"/>
+              </a:rPr>
+              <a:t>—a.k.a., </a:t>
+            </a:r>
+            <a:r>
+              <a:rPr lang="en-US" sz="1600" i="1" dirty="0">
+                <a:latin typeface="Arial" panose="020B0604020202020204" pitchFamily="34" charset="0"/>
+                <a:cs typeface="Arial" panose="020B0604020202020204" pitchFamily="34" charset="0"/>
+              </a:rPr>
+              <a:t>de novo</a:t>
+            </a:r>
+            <a:r>
+              <a:rPr lang="en-US" sz="1600" dirty="0">
+                <a:latin typeface="Arial" panose="020B0604020202020204" pitchFamily="34" charset="0"/>
+                <a:cs typeface="Arial" panose="020B0604020202020204" pitchFamily="34" charset="0"/>
+              </a:rPr>
+              <a:t>—</a:t>
+            </a:r>
+            <a:r>
+              <a:rPr lang="en-US" sz="1600" b="1" i="0" dirty="0">
+                <a:effectLst/>
+                <a:latin typeface="Arial" panose="020B0604020202020204" pitchFamily="34" charset="0"/>
+                <a:cs typeface="Arial" panose="020B0604020202020204" pitchFamily="34" charset="0"/>
+              </a:rPr>
+              <a:t>approach</a:t>
+            </a:r>
             <a:r>
               <a:rPr lang="en-US" sz="1600" b="0" i="0" dirty="0">
                 <a:effectLst/>
                 <a:latin typeface="Arial" panose="020B0604020202020204" pitchFamily="34" charset="0"/>
                 <a:cs typeface="Arial" panose="020B0604020202020204" pitchFamily="34" charset="0"/>
               </a:rPr>
-              <a:t>In the </a:t>
-            </a:r>
-            <a:r>
-              <a:rPr lang="en-US" sz="1600" b="1" i="0" dirty="0">
-                <a:effectLst/>
-                <a:latin typeface="Arial" panose="020B0604020202020204" pitchFamily="34" charset="0"/>
-                <a:cs typeface="Arial" panose="020B0604020202020204" pitchFamily="34" charset="0"/>
-              </a:rPr>
-              <a:t>genome-free approach</a:t>
-            </a:r>
-            <a:r>
-              <a:rPr lang="en-US" sz="1600" b="0" i="0" dirty="0">
-                <a:effectLst/>
-                <a:latin typeface="Arial" panose="020B0604020202020204" pitchFamily="34" charset="0"/>
-                <a:cs typeface="Arial" panose="020B0604020202020204" pitchFamily="34" charset="0"/>
-              </a:rPr>
-              <a:t>, assembly is accomplished using the information contained in the reads alone</a:t>
+              <a:t>: Assembly is accomplished using the information contained in the reads alone</a:t>
             </a:r>
           </a:p>
           <a:p>
@@ -4507,7 +4650,7 @@
                 <a:latin typeface="Arial" panose="020B0604020202020204" pitchFamily="34" charset="0"/>
                 <a:cs typeface="Arial" panose="020B0604020202020204" pitchFamily="34" charset="0"/>
               </a:rPr>
-              <a:t>In our recent work, we perform a </a:t>
+              <a:t>In our recent work, we leverage a </a:t>
             </a:r>
             <a:r>
               <a:rPr lang="en-US" sz="2000" b="1" i="0" dirty="0">
@@ -4515,7 +4658,25 @@
                 <a:latin typeface="Arial" panose="020B0604020202020204" pitchFamily="34" charset="0"/>
                 <a:cs typeface="Arial" panose="020B0604020202020204" pitchFamily="34" charset="0"/>
               </a:rPr>
-              <a:t>hybrid approach</a:t>
+              <a:t>hybrid strategy</a:t>
+            </a:r>
+            <a:endParaRPr lang="en-US" sz="2000" b="0" i="0" dirty="0">
+              <a:effectLst/>
+              <a:latin typeface="Arial" panose="020B0604020202020204" pitchFamily="34" charset="0"/>
+              <a:cs typeface="Arial" panose="020B0604020202020204" pitchFamily="34" charset="0"/>
+            </a:endParaRPr>
+          </a:p>
+          <a:p>
+            <a:pPr algn="l">
+              <a:buFont typeface="Arial" panose="020B0604020202020204" pitchFamily="34" charset="0"/>
+              <a:buChar char="•"/>
+            </a:pPr>
+            <a:r>
+              <a:rPr lang="en-US" sz="2000" dirty="0">
+                <a:latin typeface="Arial" panose="020B0604020202020204" pitchFamily="34" charset="0"/>
+                <a:cs typeface="Arial" panose="020B0604020202020204" pitchFamily="34" charset="0"/>
+              </a:rPr>
+              <a:t>...</a:t>
             </a:r>
             <a:r>
               <a:rPr lang="en-US" sz="2000" b="0" i="0" dirty="0">
@@ -4523,7 +4684,7 @@
                 <a:latin typeface="Arial" panose="020B0604020202020204" pitchFamily="34" charset="0"/>
                 <a:cs typeface="Arial" panose="020B0604020202020204" pitchFamily="34" charset="0"/>
               </a:rPr>
-              <a:t>—but before diving into that, it's important to discuss the general workflow for transcriptome assembly</a:t>
+              <a:t>but before diving into that, it's important to discuss the general workflow for transcriptome assembly</a:t>
             </a:r>
           </a:p>
         </p:txBody>
@@ -4631,691 +4792,6 @@
   <p:clrMapOvr>
     <a:masterClrMapping/>
   </p:clrMapOvr>
-  <p:timing>
-    <p:tnLst>
-      <p:par>
-        <p:cTn id="1" dur="indefinite" restart="never" nodeType="tmRoot">
-          <p:childTnLst>
-            <p:seq concurrent="1" nextAc="seek">
-              <p:cTn id="2" dur="indefinite" nodeType="mainSeq">
-                <p:childTnLst>
-                  <p:par>
-                    <p:cTn id="3" fill="hold">
-                      <p:stCondLst>
-                        <p:cond delay="indefinite"/>
-                      </p:stCondLst>
-                      <p:childTnLst>
-                        <p:par>
-                          <p:cTn id="4" fill="hold">
-                            <p:stCondLst>
-                              <p:cond delay="0"/>
-                            </p:stCondLst>
-                            <p:childTnLst>
-                              <p:par>
-                                <p:cTn id="5" presetID="10" presetClass="entr" presetSubtype="0" fill="hold" nodeType="clickEffect">
-                                  <p:stCondLst>
-                                    <p:cond delay="0"/>
-                                  </p:stCondLst>
-                                  <p:childTnLst>
-                                    <p:set>
-                                      <p:cBhvr>
-                                        <p:cTn id="6" dur="1" fill="hold">
-                                          <p:stCondLst>
-                                            <p:cond delay="0"/>
-                                          </p:stCondLst>
-                                        </p:cTn>
-                                        <p:tgtEl>
-                                          <p:spTgt spid="4">
-                                            <p:txEl>
-                                              <p:pRg st="0" end="0"/>
-                                            </p:txEl>
-                                          </p:spTgt>
-                                        </p:tgtEl>
-                                        <p:attrNameLst>
-                                          <p:attrName>style.visibility</p:attrName>
-                                        </p:attrNameLst>
-                                      </p:cBhvr>
-                                      <p:to>
-                                        <p:strVal val="visible"/>
-                                      </p:to>
-                                    </p:set>
-                                    <p:animEffect transition="in" filter="fade">
-                                      <p:cBhvr>
-                                        <p:cTn id="7" dur="500"/>
-                                        <p:tgtEl>
-                                          <p:spTgt spid="4">
-                                            <p:txEl>
-                                              <p:pRg st="0" end="0"/>
-                                            </p:txEl>
-                                          </p:spTgt>
-                                        </p:tgtEl>
-                                      </p:cBhvr>
-                                    </p:animEffect>
-                                  </p:childTnLst>
-                                </p:cTn>
-                              </p:par>
-                            </p:childTnLst>
-                          </p:cTn>
-                        </p:par>
-                      </p:childTnLst>
-                    </p:cTn>
-                  </p:par>
-                  <p:par>
-                    <p:cTn id="8" fill="hold">
-                      <p:stCondLst>
-                        <p:cond delay="indefinite"/>
-                      </p:stCondLst>
-                      <p:childTnLst>
-                        <p:par>
-                          <p:cTn id="9" fill="hold">
-                            <p:stCondLst>
-                              <p:cond delay="0"/>
-                            </p:stCondLst>
-                            <p:childTnLst>
-                              <p:par>
-                                <p:cTn id="10" presetID="10" presetClass="entr" presetSubtype="0" fill="hold" grpId="0" nodeType="clickEffect">
-                                  <p:stCondLst>
-                                    <p:cond delay="0"/>
-                                  </p:stCondLst>
-                                  <p:childTnLst>
-                                    <p:set>
-                                      <p:cBhvr>
-                                        <p:cTn id="11" dur="1" fill="hold">
-                                          <p:stCondLst>
-                                            <p:cond delay="0"/>
-                                          </p:stCondLst>
-                                        </p:cTn>
-                                        <p:tgtEl>
-                                          <p:spTgt spid="3">
-                                            <p:txEl>
-                                              <p:pRg st="0" end="0"/>
-                                            </p:txEl>
-                                          </p:spTgt>
-                                        </p:tgtEl>
-                                        <p:attrNameLst>
-                                          <p:attrName>style.visibility</p:attrName>
-                                        </p:attrNameLst>
-                                      </p:cBhvr>
-                                      <p:to>
-                                        <p:strVal val="visible"/>
-                                      </p:to>
-                                    </p:set>
-                                    <p:animEffect transition="in" filter="fade">
-                                      <p:cBhvr>
-                                        <p:cTn id="12" dur="500"/>
-                                        <p:tgtEl>
-                                          <p:spTgt spid="3">
-                                            <p:txEl>
-                                              <p:pRg st="0" end="0"/>
-                                            </p:txEl>
-                                          </p:spTgt>
-                                        </p:tgtEl>
-                                      </p:cBhvr>
-                                    </p:animEffect>
-                                  </p:childTnLst>
-                                </p:cTn>
-                              </p:par>
-                            </p:childTnLst>
-                          </p:cTn>
-                        </p:par>
-                      </p:childTnLst>
-                    </p:cTn>
-                  </p:par>
-                  <p:par>
-                    <p:cTn id="13" fill="hold">
-                      <p:stCondLst>
-                        <p:cond delay="indefinite"/>
-                      </p:stCondLst>
-                      <p:childTnLst>
-                        <p:par>
-                          <p:cTn id="14" fill="hold">
-                            <p:stCondLst>
-                              <p:cond delay="0"/>
-                            </p:stCondLst>
-                            <p:childTnLst>
-                              <p:par>
-                                <p:cTn id="15" presetID="10" presetClass="entr" presetSubtype="0" fill="hold" nodeType="clickEffect">
-                                  <p:stCondLst>
-                                    <p:cond delay="0"/>
-                                  </p:stCondLst>
-                                  <p:childTnLst>
-                                    <p:set>
-                                      <p:cBhvr>
-                                        <p:cTn id="16" dur="1" fill="hold">
-                                          <p:stCondLst>
-                                            <p:cond delay="0"/>
-                                          </p:stCondLst>
-                                        </p:cTn>
-                                        <p:tgtEl>
-                                          <p:spTgt spid="3">
-                                            <p:txEl>
-                                              <p:pRg st="1" end="1"/>
-                                            </p:txEl>
-                                          </p:spTgt>
-                                        </p:tgtEl>
-                                        <p:attrNameLst>
-                                          <p:attrName>style.visibility</p:attrName>
-                                        </p:attrNameLst>
-                                      </p:cBhvr>
-                                      <p:to>
-                                        <p:strVal val="visible"/>
-                                      </p:to>
-                                    </p:set>
-                                    <p:animEffect transition="in" filter="fade">
-                                      <p:cBhvr>
-                                        <p:cTn id="17" dur="500"/>
-                                        <p:tgtEl>
-                                          <p:spTgt spid="3">
-                                            <p:txEl>
-                                              <p:pRg st="1" end="1"/>
-                                            </p:txEl>
-                                          </p:spTgt>
-                                        </p:tgtEl>
-                                      </p:cBhvr>
-                                    </p:animEffect>
-                                  </p:childTnLst>
-                                </p:cTn>
-                              </p:par>
-                            </p:childTnLst>
-                          </p:cTn>
-                        </p:par>
-                      </p:childTnLst>
-                    </p:cTn>
-                  </p:par>
-                  <p:par>
-                    <p:cTn id="18" fill="hold">
-                      <p:stCondLst>
-                        <p:cond delay="indefinite"/>
-                      </p:stCondLst>
-                      <p:childTnLst>
-                        <p:par>
-                          <p:cTn id="19" fill="hold">
-                            <p:stCondLst>
-                              <p:cond delay="0"/>
-                            </p:stCondLst>
-                            <p:childTnLst>
-                              <p:par>
-                                <p:cTn id="20" presetID="10" presetClass="entr" presetSubtype="0" fill="hold" nodeType="clickEffect">
-                                  <p:stCondLst>
-                                    <p:cond delay="0"/>
-                                  </p:stCondLst>
-                                  <p:childTnLst>
-                                    <p:set>
-                                      <p:cBhvr>
-                                        <p:cTn id="21" dur="1" fill="hold">
-                                          <p:stCondLst>
-                                            <p:cond delay="0"/>
-                                          </p:stCondLst>
-                                        </p:cTn>
-                                        <p:tgtEl>
-                                          <p:spTgt spid="3">
-                                            <p:txEl>
-                                              <p:pRg st="2" end="2"/>
-                                            </p:txEl>
-                                          </p:spTgt>
-                                        </p:tgtEl>
-                                        <p:attrNameLst>
-                                          <p:attrName>style.visibility</p:attrName>
-                                        </p:attrNameLst>
-                                      </p:cBhvr>
-                                      <p:to>
-                                        <p:strVal val="visible"/>
-                                      </p:to>
-                                    </p:set>
-                                    <p:animEffect transition="in" filter="fade">
-                                      <p:cBhvr>
-                                        <p:cTn id="22" dur="500"/>
-                                        <p:tgtEl>
-                                          <p:spTgt spid="3">
-                                            <p:txEl>
-                                              <p:pRg st="2" end="2"/>
-                                            </p:txEl>
-                                          </p:spTgt>
-                                        </p:tgtEl>
-                                      </p:cBhvr>
-                                    </p:animEffect>
-                                  </p:childTnLst>
-                                </p:cTn>
-                              </p:par>
-                            </p:childTnLst>
-                          </p:cTn>
-                        </p:par>
-                      </p:childTnLst>
-                    </p:cTn>
-                  </p:par>
-                  <p:par>
-                    <p:cTn id="23" fill="hold">
-                      <p:stCondLst>
-                        <p:cond delay="indefinite"/>
-                      </p:stCondLst>
-                      <p:childTnLst>
-                        <p:par>
-                          <p:cTn id="24" fill="hold">
-                            <p:stCondLst>
-                              <p:cond delay="0"/>
-                            </p:stCondLst>
-                            <p:childTnLst>
-                              <p:par>
-                                <p:cTn id="25" presetID="10" presetClass="entr" presetSubtype="0" fill="hold" nodeType="clickEffect">
-                                  <p:stCondLst>
-                                    <p:cond delay="0"/>
-                                  </p:stCondLst>
-                                  <p:childTnLst>
-                                    <p:set>
-                                      <p:cBhvr>
-                                        <p:cTn id="26" dur="1" fill="hold">
-                                          <p:stCondLst>
-                                            <p:cond delay="0"/>
-                                          </p:stCondLst>
-                                        </p:cTn>
-                                        <p:tgtEl>
-                                          <p:spTgt spid="3">
-                                            <p:txEl>
-                                              <p:pRg st="3" end="3"/>
-                                            </p:txEl>
-                                          </p:spTgt>
-                                        </p:tgtEl>
-                                        <p:attrNameLst>
-                                          <p:attrName>style.visibility</p:attrName>
-                                        </p:attrNameLst>
-                                      </p:cBhvr>
-                                      <p:to>
-                                        <p:strVal val="visible"/>
-                                      </p:to>
-                                    </p:set>
-                                    <p:animEffect transition="in" filter="fade">
-                                      <p:cBhvr>
-                                        <p:cTn id="27" dur="500"/>
-                                        <p:tgtEl>
-                                          <p:spTgt spid="3">
-                                            <p:txEl>
-                                              <p:pRg st="3" end="3"/>
-                                            </p:txEl>
-                                          </p:spTgt>
-                                        </p:tgtEl>
-                                      </p:cBhvr>
-                                    </p:animEffect>
-                                  </p:childTnLst>
-                                </p:cTn>
-                              </p:par>
-                            </p:childTnLst>
-                          </p:cTn>
-                        </p:par>
-                      </p:childTnLst>
-                    </p:cTn>
-                  </p:par>
-                  <p:par>
-                    <p:cTn id="28" fill="hold">
-                      <p:stCondLst>
-                        <p:cond delay="indefinite"/>
-                      </p:stCondLst>
-                      <p:childTnLst>
-                        <p:par>
-                          <p:cTn id="29" fill="hold">
-                            <p:stCondLst>
-                              <p:cond delay="0"/>
-                            </p:stCondLst>
-                            <p:childTnLst>
-                              <p:par>
-                                <p:cTn id="30" presetID="10" presetClass="entr" presetSubtype="0" fill="hold" nodeType="clickEffect">
-                                  <p:stCondLst>
-                                    <p:cond delay="0"/>
-                                  </p:stCondLst>
-                                  <p:childTnLst>
-                                    <p:set>
-                                      <p:cBhvr>
-                                        <p:cTn id="31" dur="1" fill="hold">
-                                          <p:stCondLst>
-                                            <p:cond delay="0"/>
-                                          </p:stCondLst>
-                                        </p:cTn>
-                                        <p:tgtEl>
-                                          <p:spTgt spid="3">
-                                            <p:txEl>
-                                              <p:pRg st="4" end="4"/>
-                                            </p:txEl>
-                                          </p:spTgt>
-                                        </p:tgtEl>
-                                        <p:attrNameLst>
-                                          <p:attrName>style.visibility</p:attrName>
-                                        </p:attrNameLst>
-                                      </p:cBhvr>
-                                      <p:to>
-                                        <p:strVal val="visible"/>
-                                      </p:to>
-                                    </p:set>
-                                    <p:animEffect transition="in" filter="fade">
-                                      <p:cBhvr>
-                                        <p:cTn id="32" dur="500"/>
-                                        <p:tgtEl>
-                                          <p:spTgt spid="3">
-                                            <p:txEl>
-                                              <p:pRg st="4" end="4"/>
-                                            </p:txEl>
-                                          </p:spTgt>
-                                        </p:tgtEl>
-                                      </p:cBhvr>
-                                    </p:animEffect>
-                                  </p:childTnLst>
-                                </p:cTn>
-                              </p:par>
-                            </p:childTnLst>
-                          </p:cTn>
-                        </p:par>
-                      </p:childTnLst>
-                    </p:cTn>
-                  </p:par>
-                  <p:par>
-                    <p:cTn id="33" fill="hold">
-                      <p:stCondLst>
-                        <p:cond delay="indefinite"/>
-                      </p:stCondLst>
-                      <p:childTnLst>
-                        <p:par>
-                          <p:cTn id="34" fill="hold">
-                            <p:stCondLst>
-                              <p:cond delay="0"/>
-                            </p:stCondLst>
-                            <p:childTnLst>
-                              <p:par>
-                                <p:cTn id="35" presetID="10" presetClass="entr" presetSubtype="0" fill="hold" nodeType="clickEffect">
-                                  <p:stCondLst>
-                                    <p:cond delay="0"/>
-                                  </p:stCondLst>
-                                  <p:childTnLst>
-                                    <p:set>
-                                      <p:cBhvr>
-                                        <p:cTn id="36" dur="1" fill="hold">
-                                          <p:stCondLst>
-                                            <p:cond delay="0"/>
-                                          </p:stCondLst>
-                                        </p:cTn>
-                                        <p:tgtEl>
-                                          <p:spTgt spid="6"/>
-                                        </p:tgtEl>
-                                        <p:attrNameLst>
-                                          <p:attrName>style.visibility</p:attrName>
-                                        </p:attrNameLst>
-                                      </p:cBhvr>
-                                      <p:to>
-                                        <p:strVal val="visible"/>
-                                      </p:to>
-                                    </p:set>
-                                    <p:animEffect transition="in" filter="fade">
-                                      <p:cBhvr>
-                                        <p:cTn id="37" dur="500"/>
-                                        <p:tgtEl>
-                                          <p:spTgt spid="6"/>
-                                        </p:tgtEl>
-                                      </p:cBhvr>
-                                    </p:animEffect>
-                                  </p:childTnLst>
-                                </p:cTn>
-                              </p:par>
-                            </p:childTnLst>
-                          </p:cTn>
-                        </p:par>
-                      </p:childTnLst>
-                    </p:cTn>
-                  </p:par>
-                  <p:par>
-                    <p:cTn id="38" fill="hold">
-                      <p:stCondLst>
-                        <p:cond delay="indefinite"/>
-                      </p:stCondLst>
-                      <p:childTnLst>
-                        <p:par>
-                          <p:cTn id="39" fill="hold">
-                            <p:stCondLst>
-                              <p:cond delay="0"/>
-                            </p:stCondLst>
-                            <p:childTnLst>
-                              <p:par>
-                                <p:cTn id="40" presetID="10" presetClass="exit" presetSubtype="0" fill="hold" nodeType="clickEffect">
-                                  <p:stCondLst>
-                                    <p:cond delay="0"/>
-                                  </p:stCondLst>
-                                  <p:childTnLst>
-                                    <p:animEffect transition="out" filter="fade">
-                                      <p:cBhvr>
-                                        <p:cTn id="41" dur="500"/>
-                                        <p:tgtEl>
-                                          <p:spTgt spid="3">
-                                            <p:txEl>
-                                              <p:pRg st="0" end="0"/>
-                                            </p:txEl>
-                                          </p:spTgt>
-                                        </p:tgtEl>
-                                      </p:cBhvr>
-                                    </p:animEffect>
-                                    <p:set>
-                                      <p:cBhvr>
-                                        <p:cTn id="42" dur="1" fill="hold">
-                                          <p:stCondLst>
-                                            <p:cond delay="499"/>
-                                          </p:stCondLst>
-                                        </p:cTn>
-                                        <p:tgtEl>
-                                          <p:spTgt spid="3">
-                                            <p:txEl>
-                                              <p:pRg st="0" end="0"/>
-                                            </p:txEl>
-                                          </p:spTgt>
-                                        </p:tgtEl>
-                                        <p:attrNameLst>
-                                          <p:attrName>style.visibility</p:attrName>
-                                        </p:attrNameLst>
-                                      </p:cBhvr>
-                                      <p:to>
-                                        <p:strVal val="hidden"/>
-                                      </p:to>
-                                    </p:set>
-                                  </p:childTnLst>
-                                </p:cTn>
-                              </p:par>
-                              <p:par>
-                                <p:cTn id="43" presetID="10" presetClass="exit" presetSubtype="0" fill="hold" nodeType="withEffect">
-                                  <p:stCondLst>
-                                    <p:cond delay="0"/>
-                                  </p:stCondLst>
-                                  <p:childTnLst>
-                                    <p:animEffect transition="out" filter="fade">
-                                      <p:cBhvr>
-                                        <p:cTn id="44" dur="500"/>
-                                        <p:tgtEl>
-                                          <p:spTgt spid="3">
-                                            <p:txEl>
-                                              <p:pRg st="1" end="1"/>
-                                            </p:txEl>
-                                          </p:spTgt>
-                                        </p:tgtEl>
-                                      </p:cBhvr>
-                                    </p:animEffect>
-                                    <p:set>
-                                      <p:cBhvr>
-                                        <p:cTn id="45" dur="1" fill="hold">
-                                          <p:stCondLst>
-                                            <p:cond delay="499"/>
-                                          </p:stCondLst>
-                                        </p:cTn>
-                                        <p:tgtEl>
-                                          <p:spTgt spid="3">
-                                            <p:txEl>
-                                              <p:pRg st="1" end="1"/>
-                                            </p:txEl>
-                                          </p:spTgt>
-                                        </p:tgtEl>
-                                        <p:attrNameLst>
-                                          <p:attrName>style.visibility</p:attrName>
-                                        </p:attrNameLst>
-                                      </p:cBhvr>
-                                      <p:to>
-                                        <p:strVal val="hidden"/>
-                                      </p:to>
-                                    </p:set>
-                                  </p:childTnLst>
-                                </p:cTn>
-                              </p:par>
-                              <p:par>
-                                <p:cTn id="46" presetID="10" presetClass="exit" presetSubtype="0" fill="hold" nodeType="withEffect">
-                                  <p:stCondLst>
-                                    <p:cond delay="0"/>
-                                  </p:stCondLst>
-                                  <p:childTnLst>
-                                    <p:animEffect transition="out" filter="fade">
-                                      <p:cBhvr>
-                                        <p:cTn id="47" dur="500"/>
-                                        <p:tgtEl>
-                                          <p:spTgt spid="3">
-                                            <p:txEl>
-                                              <p:pRg st="2" end="2"/>
-                                            </p:txEl>
-                                          </p:spTgt>
-                                        </p:tgtEl>
-                                      </p:cBhvr>
-                                    </p:animEffect>
-                                    <p:set>
-                                      <p:cBhvr>
-                                        <p:cTn id="48" dur="1" fill="hold">
-                                          <p:stCondLst>
-                                            <p:cond delay="499"/>
-                                          </p:stCondLst>
-                                        </p:cTn>
-                                        <p:tgtEl>
-                                          <p:spTgt spid="3">
-                                            <p:txEl>
-                                              <p:pRg st="2" end="2"/>
-                                            </p:txEl>
-                                          </p:spTgt>
-                                        </p:tgtEl>
-                                        <p:attrNameLst>
-                                          <p:attrName>style.visibility</p:attrName>
-                                        </p:attrNameLst>
-                                      </p:cBhvr>
-                                      <p:to>
-                                        <p:strVal val="hidden"/>
-                                      </p:to>
-                                    </p:set>
-                                  </p:childTnLst>
-                                </p:cTn>
-                              </p:par>
-                              <p:par>
-                                <p:cTn id="49" presetID="10" presetClass="exit" presetSubtype="0" fill="hold" nodeType="withEffect">
-                                  <p:stCondLst>
-                                    <p:cond delay="0"/>
-                                  </p:stCondLst>
-                                  <p:childTnLst>
-                                    <p:animEffect transition="out" filter="fade">
-                                      <p:cBhvr>
-                                        <p:cTn id="50" dur="500"/>
-                                        <p:tgtEl>
-                                          <p:spTgt spid="3">
-                                            <p:txEl>
-                                              <p:pRg st="3" end="3"/>
-                                            </p:txEl>
-                                          </p:spTgt>
-                                        </p:tgtEl>
-                                      </p:cBhvr>
-                                    </p:animEffect>
-                                    <p:set>
-                                      <p:cBhvr>
-                                        <p:cTn id="51" dur="1" fill="hold">
-                                          <p:stCondLst>
-                                            <p:cond delay="499"/>
-                                          </p:stCondLst>
-                                        </p:cTn>
-                                        <p:tgtEl>
-                                          <p:spTgt spid="3">
-                                            <p:txEl>
-                                              <p:pRg st="3" end="3"/>
-                                            </p:txEl>
-                                          </p:spTgt>
-                                        </p:tgtEl>
-                                        <p:attrNameLst>
-                                          <p:attrName>style.visibility</p:attrName>
-                                        </p:attrNameLst>
-                                      </p:cBhvr>
-                                      <p:to>
-                                        <p:strVal val="hidden"/>
-                                      </p:to>
-                                    </p:set>
-                                  </p:childTnLst>
-                                </p:cTn>
-                              </p:par>
-                              <p:par>
-                                <p:cTn id="52" presetID="10" presetClass="exit" presetSubtype="0" fill="hold" nodeType="withEffect">
-                                  <p:stCondLst>
-                                    <p:cond delay="0"/>
-                                  </p:stCondLst>
-                                  <p:childTnLst>
-                                    <p:animEffect transition="out" filter="fade">
-                                      <p:cBhvr>
-                                        <p:cTn id="53" dur="500"/>
-                                        <p:tgtEl>
-                                          <p:spTgt spid="3">
-                                            <p:txEl>
-                                              <p:pRg st="4" end="4"/>
-                                            </p:txEl>
-                                          </p:spTgt>
-                                        </p:tgtEl>
-                                      </p:cBhvr>
-                                    </p:animEffect>
-                                    <p:set>
-                                      <p:cBhvr>
-                                        <p:cTn id="54" dur="1" fill="hold">
-                                          <p:stCondLst>
-                                            <p:cond delay="499"/>
-                                          </p:stCondLst>
-                                        </p:cTn>
-                                        <p:tgtEl>
-                                          <p:spTgt spid="3">
-                                            <p:txEl>
-                                              <p:pRg st="4" end="4"/>
-                                            </p:txEl>
-                                          </p:spTgt>
-                                        </p:tgtEl>
-                                        <p:attrNameLst>
-                                          <p:attrName>style.visibility</p:attrName>
-                                        </p:attrNameLst>
-                                      </p:cBhvr>
-                                      <p:to>
-                                        <p:strVal val="hidden"/>
-                                      </p:to>
-                                    </p:set>
-                                  </p:childTnLst>
-                                </p:cTn>
-                              </p:par>
-                            </p:childTnLst>
-                          </p:cTn>
-                        </p:par>
-                      </p:childTnLst>
-                    </p:cTn>
-                  </p:par>
-                </p:childTnLst>
-              </p:cTn>
-              <p:prevCondLst>
-                <p:cond evt="onPrev" delay="0">
-                  <p:tgtEl>
-                    <p:sldTgt/>
-                  </p:tgtEl>
-                </p:cond>
-              </p:prevCondLst>
-              <p:nextCondLst>
-                <p:cond evt="onNext" delay="0">
-                  <p:tgtEl>
-                    <p:sldTgt/>
-                  </p:tgtEl>
-                </p:cond>
-              </p:nextCondLst>
-            </p:seq>
-          </p:childTnLst>
-        </p:cTn>
-      </p:par>
-    </p:tnLst>
-    <p:bldLst>
-      <p:bldP spid="3" grpId="0" uiExpand="1" build="p"/>
-    </p:bldLst>
-  </p:timing>
 </p:sld>
 </file>
 
@@ -5355,7 +4831,7 @@
         <p:spPr>
           <a:xfrm>
             <a:off x="-1" y="794657"/>
-            <a:ext cx="7239001" cy="5159829"/>
+            <a:ext cx="7239001" cy="5834743"/>
           </a:xfrm>
         </p:spPr>
         <p:txBody>
@@ -5566,6 +5042,48 @@
               </a:rPr>
               <a:t>) The nucleotide (and/or translated protein) sequences can be annotated to assign identifiers and elucidate biological roles</a:t>
             </a:r>
+          </a:p>
+          <a:p>
+            <a:r>
+              <a:rPr lang="en-US" sz="2000" dirty="0">
+                <a:latin typeface="Arial" panose="020B0604020202020204" pitchFamily="34" charset="0"/>
+                <a:cs typeface="Arial" panose="020B0604020202020204" pitchFamily="34" charset="0"/>
+              </a:rPr>
+              <a:t>Today, I will show data from steps (</a:t>
+            </a:r>
+            <a:r>
+              <a:rPr lang="en-US" sz="2000" b="1" dirty="0">
+                <a:latin typeface="Arial" panose="020B0604020202020204" pitchFamily="34" charset="0"/>
+                <a:cs typeface="Arial" panose="020B0604020202020204" pitchFamily="34" charset="0"/>
+              </a:rPr>
+              <a:t>A</a:t>
+            </a:r>
+            <a:r>
+              <a:rPr lang="en-US" sz="2000" dirty="0">
+                <a:latin typeface="Arial" panose="020B0604020202020204" pitchFamily="34" charset="0"/>
+                <a:cs typeface="Arial" panose="020B0604020202020204" pitchFamily="34" charset="0"/>
+              </a:rPr>
+              <a:t>) and (</a:t>
+            </a:r>
+            <a:r>
+              <a:rPr lang="en-US" sz="2000" b="1" dirty="0">
+                <a:latin typeface="Arial" panose="020B0604020202020204" pitchFamily="34" charset="0"/>
+                <a:cs typeface="Arial" panose="020B0604020202020204" pitchFamily="34" charset="0"/>
+              </a:rPr>
+              <a:t>B</a:t>
+            </a:r>
+            <a:r>
+              <a:rPr lang="en-US" sz="2000" dirty="0">
+                <a:latin typeface="Arial" panose="020B0604020202020204" pitchFamily="34" charset="0"/>
+                <a:cs typeface="Arial" panose="020B0604020202020204" pitchFamily="34" charset="0"/>
+              </a:rPr>
+              <a:t>)</a:t>
+            </a:r>
+            <a:endParaRPr lang="en-US" sz="2000" b="0" i="0" dirty="0">
+              <a:effectLst/>
+              <a:latin typeface="Arial" panose="020B0604020202020204" pitchFamily="34" charset="0"/>
+              <a:cs typeface="Arial" panose="020B0604020202020204" pitchFamily="34" charset="0"/>
+            </a:endParaRPr>
           </a:p>
         </p:txBody>
       </p:sp>
@@ -6046,6 +5564,67 @@
                       </p:childTnLst>
                     </p:cTn>
                   </p:par>
+                  <p:par>
+                    <p:cTn id="33" fill="hold">
+                      <p:stCondLst>
+                        <p:cond delay="indefinite"/>
+                      </p:stCondLst>
+                      <p:childTnLst>
+                        <p:par>
+                          <p:cTn id="34" fill="hold">
+                            <p:stCondLst>
+                              <p:cond delay="0"/>
+                            </p:stCondLst>
+                            <p:childTnLst>
+                              <p:par>
+                                <p:cTn id="35" presetID="10" presetClass="entr" presetSubtype="0" fill="hold" grpId="0" nodeType="clickEffect">
+                                  <p:stCondLst>
+                                    <p:cond delay="0"/>
+                                  </p:stCondLst>
+                                  <p:childTnLst>
+                                    <p:set>
+                                      <p:cBhvr>
+                                        <p:cTn id="36" dur="1" fill="hold">
+                                          <p:stCondLst>
+                                            <p:cond delay="0"/>
+                                          </p:stCondLst>
+                                        </p:cTn>
+                                        <p:tgtEl>
+                                          <p:spTgt spid="3">
+                                            <p:txEl>
+                                              <p:pRg st="6" end="6"/>
+                                            </p:txEl>
+                                          </p:spTgt>
+                                        </p:tgtEl>
+                                        <p:attrNameLst>
+                                          <p:attrName>style.visibility</p:attrName>
+                                        </p:attrNameLst>
+                                      </p:cBhvr>
+                                      <p:to>
+                                        <p:strVal val="visible"/>
+                                      </p:to>
+                                    </p:set>
+                                    <p:animEffect transition="in" filter="fade">
+                                      <p:cBhvr>
+                                        <p:cTn id="37" dur="500"/>
+                                        <p:tgtEl>
+                                          <p:spTgt spid="3">
+                                            <p:txEl>
+                                              <p:pRg st="6" end="6"/>
+                                            </p:txEl>
+                                          </p:spTgt>
+                                        </p:tgtEl>
+                                      </p:cBhvr>
+                                    </p:animEffect>
+                                  </p:childTnLst>
+                                </p:cTn>
+                              </p:par>
+                            </p:childTnLst>
+                          </p:cTn>
+                        </p:par>
+                      </p:childTnLst>
+                    </p:cTn>
+                  </p:par>
                 </p:childTnLst>
               </p:cTn>
               <p:prevCondLst>
@@ -6075,7 +5654,7 @@
 </file>
 
 <file path=ppt/slides/slide6.xml><?xml version="1.0" encoding="utf-8"?>
-<p:sld xmlns:a="http://schemas.openxmlformats.org/drawingml/2006/main" xmlns:r="http://schemas.openxmlformats.org/officeDocument/2006/relationships" xmlns:p="http://schemas.openxmlformats.org/presentationml/2006/main" show="0">
+<p:sld xmlns:a="http://schemas.openxmlformats.org/drawingml/2006/main" xmlns:r="http://schemas.openxmlformats.org/officeDocument/2006/relationships" xmlns:p="http://schemas.openxmlformats.org/presentationml/2006/main">
   <p:cSld>
     <p:spTree>
       <p:nvGrpSpPr>
@@ -6109,9 +5688,12 @@
         </p:nvSpPr>
         <p:spPr>
           <a:xfrm>
-            <a:off x="-1" y="794657"/>
-            <a:ext cx="4719485" cy="5159829"/>
+            <a:off x="0" y="794657"/>
+            <a:ext cx="6096000" cy="6063343"/>
           </a:xfrm>
+          <a:solidFill>
+            <a:schemeClr val="bg1"/>
+          </a:solidFill>
         </p:spPr>
         <p:txBody>
           <a:bodyPr>
@@ -6145,7 +5727,49 @@
                 <a:latin typeface="Arial" panose="020B0604020202020204" pitchFamily="34" charset="0"/>
                 <a:cs typeface="Arial" panose="020B0604020202020204" pitchFamily="34" charset="0"/>
               </a:rPr>
-              <a:t> to perform adapter removal, trim low-quality read ends, filter out very short reads</a:t>
+              <a:t> to...</a:t>
+            </a:r>
+          </a:p>
+          <a:p>
+            <a:pPr marL="800100" lvl="1" indent="-342900">
+              <a:buFont typeface="+mj-lt"/>
+              <a:buAutoNum type="alphaLcParenR"/>
+            </a:pPr>
+            <a:r>
+              <a:rPr lang="en-US" sz="1600" b="0" i="0" dirty="0">
+                <a:effectLst/>
+                <a:latin typeface="Arial" panose="020B0604020202020204" pitchFamily="34" charset="0"/>
+                <a:cs typeface="Arial" panose="020B0604020202020204" pitchFamily="34" charset="0"/>
+              </a:rPr>
+              <a:t>perform adapter removal</a:t>
+            </a:r>
+          </a:p>
+          <a:p>
+            <a:pPr marL="800100" lvl="1" indent="-342900">
+              <a:buFont typeface="+mj-lt"/>
+              <a:buAutoNum type="alphaLcParenR"/>
+            </a:pPr>
+            <a:r>
+              <a:rPr lang="en-US" sz="1600" b="0" i="0" dirty="0">
+                <a:effectLst/>
+                <a:latin typeface="Arial" panose="020B0604020202020204" pitchFamily="34" charset="0"/>
+                <a:cs typeface="Arial" panose="020B0604020202020204" pitchFamily="34" charset="0"/>
+              </a:rPr>
+              <a:t>trim low-quality read ends</a:t>
+            </a:r>
+          </a:p>
+          <a:p>
+            <a:pPr marL="800100" lvl="1" indent="-342900">
+              <a:buFont typeface="+mj-lt"/>
+              <a:buAutoNum type="alphaLcParenR"/>
+            </a:pPr>
+            <a:r>
+              <a:rPr lang="en-US" sz="1600" b="0" i="0" dirty="0">
+                <a:effectLst/>
+                <a:latin typeface="Arial" panose="020B0604020202020204" pitchFamily="34" charset="0"/>
+                <a:cs typeface="Arial" panose="020B0604020202020204" pitchFamily="34" charset="0"/>
+              </a:rPr>
+              <a:t>filter out very short reads</a:t>
             </a:r>
           </a:p>
           <a:p>
@@ -6186,7 +5810,7 @@
                 <a:latin typeface="Arial" panose="020B0604020202020204" pitchFamily="34" charset="0"/>
                 <a:cs typeface="Arial" panose="020B0604020202020204" pitchFamily="34" charset="0"/>
               </a:rPr>
-              <a:t>We use </a:t>
+              <a:t>For transcriptome assembly, we run the assembly program </a:t>
             </a:r>
             <a:r>
               <a:rPr lang="en-US" sz="2000" b="0" i="0" dirty="0">
@@ -6202,7 +5826,7 @@
                 <a:latin typeface="Arial" panose="020B0604020202020204" pitchFamily="34" charset="0"/>
                 <a:cs typeface="Arial" panose="020B0604020202020204" pitchFamily="34" charset="0"/>
               </a:rPr>
-              <a:t> for transcriptome assembly, performing both genome-free and genome-guided approaches to generate a “comprehensive transcriptome database”</a:t>
+              <a:t> in both its genome-free and genome-guided modes</a:t>
             </a:r>
           </a:p>
           <a:p>
@@ -6211,31 +5835,85 @@
               <a:buChar char="•"/>
             </a:pPr>
             <a:r>
-              <a:rPr lang="en-US" sz="2000" dirty="0">
-                <a:latin typeface="Arial" panose="020B0604020202020204" pitchFamily="34" charset="0"/>
-                <a:cs typeface="Arial" panose="020B0604020202020204" pitchFamily="34" charset="0"/>
-              </a:rPr>
-              <a:t>We use </a:t>
+              <a:rPr lang="en-US" sz="2000" b="0" i="0" dirty="0">
+                <a:effectLst/>
+                <a:latin typeface="Arial" panose="020B0604020202020204" pitchFamily="34" charset="0"/>
+                <a:cs typeface="Arial" panose="020B0604020202020204" pitchFamily="34" charset="0"/>
+              </a:rPr>
+              <a:t>We use the output of </a:t>
             </a:r>
             <a:r>
               <a:rPr lang="en-US" sz="2000" dirty="0">
                 <a:latin typeface="Consolas" panose="020B0609020204030204" pitchFamily="49" charset="0"/>
                 <a:cs typeface="Consolas" panose="020B0609020204030204" pitchFamily="49" charset="0"/>
               </a:rPr>
+              <a:t>Trinity</a:t>
+            </a:r>
+            <a:r>
+              <a:rPr lang="en-US" sz="2000" b="0" i="0" dirty="0">
+                <a:effectLst/>
+                <a:latin typeface="Arial" panose="020B0604020202020204" pitchFamily="34" charset="0"/>
+                <a:cs typeface="Arial" panose="020B0604020202020204" pitchFamily="34" charset="0"/>
+              </a:rPr>
+              <a:t> as input to </a:t>
+            </a:r>
+            <a:r>
+              <a:rPr lang="en-US" sz="2000" dirty="0">
+                <a:latin typeface="Consolas" panose="020B0609020204030204" pitchFamily="49" charset="0"/>
+                <a:cs typeface="Consolas" panose="020B0609020204030204" pitchFamily="49" charset="0"/>
+              </a:rPr>
               <a:t>PASA</a:t>
             </a:r>
             <a:r>
-              <a:rPr lang="en-US" sz="2000" dirty="0">
-                <a:latin typeface="Arial" panose="020B0604020202020204" pitchFamily="34" charset="0"/>
-                <a:cs typeface="Arial" panose="020B0604020202020204" pitchFamily="34" charset="0"/>
-              </a:rPr>
-              <a:t> for post-assembly quality control, </a:t>
-            </a:r>
-            <a:endParaRPr lang="en-US" sz="2000" b="0" i="0" dirty="0">
-              <a:effectLst/>
-              <a:latin typeface="Arial" panose="020B0604020202020204" pitchFamily="34" charset="0"/>
-              <a:cs typeface="Arial" panose="020B0604020202020204" pitchFamily="34" charset="0"/>
-            </a:endParaRPr>
+              <a:rPr lang="en-US" sz="2000" b="0" i="0" dirty="0">
+                <a:effectLst/>
+                <a:latin typeface="Arial" panose="020B0604020202020204" pitchFamily="34" charset="0"/>
+                <a:cs typeface="Arial" panose="020B0604020202020204" pitchFamily="34" charset="0"/>
+              </a:rPr>
+              <a:t>  (Program to Assemble Spliced Alignments), which...</a:t>
+            </a:r>
+          </a:p>
+          <a:p>
+            <a:pPr marL="800100" lvl="1" indent="-342900">
+              <a:buFont typeface="+mj-lt"/>
+              <a:buAutoNum type="alphaLcParenR"/>
+            </a:pPr>
+            <a:r>
+              <a:rPr lang="en-US" sz="1600" b="0" i="0" dirty="0">
+                <a:effectLst/>
+                <a:latin typeface="Arial" panose="020B0604020202020204" pitchFamily="34" charset="0"/>
+                <a:cs typeface="Arial" panose="020B0604020202020204" pitchFamily="34" charset="0"/>
+              </a:rPr>
+              <a:t>aligns the newly assembled transcripts to the genome</a:t>
+            </a:r>
+          </a:p>
+          <a:p>
+            <a:pPr marL="800100" lvl="1" indent="-342900">
+              <a:buFont typeface="+mj-lt"/>
+              <a:buAutoNum type="alphaLcParenR"/>
+            </a:pPr>
+            <a:r>
+              <a:rPr lang="en-US" sz="1600" b="0" i="0" dirty="0">
+                <a:effectLst/>
+                <a:latin typeface="Arial" panose="020B0604020202020204" pitchFamily="34" charset="0"/>
+                <a:cs typeface="Arial" panose="020B0604020202020204" pitchFamily="34" charset="0"/>
+              </a:rPr>
+              <a:t>filters invalid alignments and transcripts likely to be artifacts of the RNA-Seq assembly process</a:t>
+            </a:r>
+          </a:p>
+          <a:p>
+            <a:pPr marL="800100" lvl="1" indent="-342900">
+              <a:buFont typeface="+mj-lt"/>
+              <a:buAutoNum type="alphaLcParenR"/>
+            </a:pPr>
+            <a:r>
+              <a:rPr lang="en-US" sz="1600" b="0" i="0" dirty="0">
+                <a:effectLst/>
+                <a:latin typeface="Arial" panose="020B0604020202020204" pitchFamily="34" charset="0"/>
+                <a:cs typeface="Arial" panose="020B0604020202020204" pitchFamily="34" charset="0"/>
+              </a:rPr>
+              <a:t>and reconstructs more complete transcripts using its alignment assembly algorithm</a:t>
+            </a:r>
           </a:p>
         </p:txBody>
       </p:sp>
@@ -6324,14 +6002,122 @@
         </p:blipFill>
         <p:spPr>
           <a:xfrm>
-            <a:off x="5034987" y="792473"/>
-            <a:ext cx="6877975" cy="9084811"/>
+            <a:off x="6096000" y="794656"/>
+            <a:ext cx="8196942" cy="10826976"/>
           </a:xfrm>
           <a:prstGeom prst="rect">
             <a:avLst/>
           </a:prstGeom>
         </p:spPr>
       </p:pic>
+      <p:sp>
+        <p:nvSpPr>
+          <p:cNvPr id="2" name="Rectangle 1">
+            <a:extLst>
+              <a:ext uri="{FF2B5EF4-FFF2-40B4-BE49-F238E27FC236}">
+                <a16:creationId xmlns:a16="http://schemas.microsoft.com/office/drawing/2014/main" id="{DA086DE7-A8D8-3E52-4B32-4F8B7552727E}"/>
+              </a:ext>
+            </a:extLst>
+          </p:cNvPr>
+          <p:cNvSpPr/>
+          <p:nvPr/>
+        </p:nvSpPr>
+        <p:spPr>
+          <a:xfrm>
+            <a:off x="11020926" y="2562726"/>
+            <a:ext cx="1171074" cy="4415590"/>
+          </a:xfrm>
+          <a:prstGeom prst="rect">
+            <a:avLst/>
+          </a:prstGeom>
+          <a:solidFill>
+            <a:schemeClr val="bg1">
+              <a:alpha val="90000"/>
+            </a:schemeClr>
+          </a:solidFill>
+          <a:ln>
+            <a:noFill/>
+          </a:ln>
+        </p:spPr>
+        <p:style>
+          <a:lnRef idx="2">
+            <a:schemeClr val="accent1">
+              <a:shade val="50000"/>
+            </a:schemeClr>
+          </a:lnRef>
+          <a:fillRef idx="1">
+            <a:schemeClr val="accent1"/>
+          </a:fillRef>
+          <a:effectRef idx="0">
+            <a:schemeClr val="accent1"/>
+          </a:effectRef>
+          <a:fontRef idx="minor">
+            <a:schemeClr val="lt1"/>
+          </a:fontRef>
+        </p:style>
+        <p:txBody>
+          <a:bodyPr rtlCol="0" anchor="ctr"/>
+          <a:lstStyle/>
+          <a:p>
+            <a:pPr algn="ctr"/>
+            <a:endParaRPr lang="en-US"/>
+          </a:p>
+        </p:txBody>
+      </p:sp>
+      <p:sp>
+        <p:nvSpPr>
+          <p:cNvPr id="5" name="Rectangle 4">
+            <a:extLst>
+              <a:ext uri="{FF2B5EF4-FFF2-40B4-BE49-F238E27FC236}">
+                <a16:creationId xmlns:a16="http://schemas.microsoft.com/office/drawing/2014/main" id="{6A66FB83-B1FB-D41A-E7BA-9E52C8436A2C}"/>
+              </a:ext>
+            </a:extLst>
+          </p:cNvPr>
+          <p:cNvSpPr/>
+          <p:nvPr/>
+        </p:nvSpPr>
+        <p:spPr>
+          <a:xfrm>
+            <a:off x="8057712" y="6733674"/>
+            <a:ext cx="1171074" cy="272716"/>
+          </a:xfrm>
+          <a:prstGeom prst="rect">
+            <a:avLst/>
+          </a:prstGeom>
+          <a:solidFill>
+            <a:schemeClr val="bg1">
+              <a:alpha val="90000"/>
+            </a:schemeClr>
+          </a:solidFill>
+          <a:ln>
+            <a:noFill/>
+          </a:ln>
+        </p:spPr>
+        <p:style>
+          <a:lnRef idx="2">
+            <a:schemeClr val="accent1">
+              <a:shade val="50000"/>
+            </a:schemeClr>
+          </a:lnRef>
+          <a:fillRef idx="1">
+            <a:schemeClr val="accent1"/>
+          </a:fillRef>
+          <a:effectRef idx="0">
+            <a:schemeClr val="accent1"/>
+          </a:effectRef>
+          <a:fontRef idx="minor">
+            <a:schemeClr val="lt1"/>
+          </a:fontRef>
+        </p:style>
+        <p:txBody>
+          <a:bodyPr rtlCol="0" anchor="ctr"/>
+          <a:lstStyle/>
+          <a:p>
+            <a:pPr algn="ctr"/>
+            <a:endParaRPr lang="en-US"/>
+          </a:p>
+        </p:txBody>
+      </p:sp>
     </p:spTree>
     <p:extLst>
       <p:ext uri="{BB962C8B-B14F-4D97-AF65-F5344CB8AC3E}">
@@ -6346,6 +6132,270 @@
 </file>
 
 <file path=ppt/slides/slide7.xml><?xml version="1.0" encoding="utf-8"?>
+<p:sld xmlns:a="http://schemas.openxmlformats.org/drawingml/2006/main" xmlns:r="http://schemas.openxmlformats.org/officeDocument/2006/relationships" xmlns:p="http://schemas.openxmlformats.org/presentationml/2006/main" show="0">
+  <p:cSld>
+    <p:spTree>
+      <p:nvGrpSpPr>
+        <p:cNvPr id="1" name=""/>
+        <p:cNvGrpSpPr/>
+        <p:nvPr/>
+      </p:nvGrpSpPr>
+      <p:grpSpPr>
+        <a:xfrm>
+          <a:off x="0" y="0"/>
+          <a:ext cx="0" cy="0"/>
+          <a:chOff x="0" y="0"/>
+          <a:chExt cx="0" cy="0"/>
+        </a:xfrm>
+      </p:grpSpPr>
+      <p:sp>
+        <p:nvSpPr>
+          <p:cNvPr id="2" name="Title 1">
+            <a:extLst>
+              <a:ext uri="{FF2B5EF4-FFF2-40B4-BE49-F238E27FC236}">
+                <a16:creationId xmlns:a16="http://schemas.microsoft.com/office/drawing/2014/main" id="{BB8FD661-F793-310D-A748-AC08E4DBF6B7}"/>
+              </a:ext>
+            </a:extLst>
+          </p:cNvPr>
+          <p:cNvSpPr>
+            <a:spLocks noGrp="1"/>
+          </p:cNvSpPr>
+          <p:nvPr>
+            <p:ph type="title"/>
+          </p:nvPr>
+        </p:nvSpPr>
+        <p:spPr>
+          <a:xfrm>
+            <a:off x="0" y="6063343"/>
+            <a:ext cx="12192000" cy="794657"/>
+          </a:xfrm>
+        </p:spPr>
+        <p:txBody>
+          <a:bodyPr>
+            <a:noAutofit/>
+          </a:bodyPr>
+          <a:lstStyle/>
+          <a:p>
+            <a:pPr algn="r"/>
+            <a:r>
+              <a:rPr lang="en-US" sz="2200" b="0" i="0" dirty="0">
+                <a:solidFill>
+                  <a:srgbClr val="737373"/>
+                </a:solidFill>
+                <a:effectLst/>
+                <a:latin typeface="Arial" panose="020B0604020202020204" pitchFamily="34" charset="0"/>
+                <a:cs typeface="Arial" panose="020B0604020202020204" pitchFamily="34" charset="0"/>
+              </a:rPr>
+              <a:t>The 4tU-seq-derived assembly makes it possible to characterize cryptic transcription—</a:t>
+            </a:r>
+            <a:r>
+              <a:rPr lang="en-US" sz="2200" b="1" i="1" dirty="0">
+                <a:solidFill>
+                  <a:srgbClr val="737373"/>
+                </a:solidFill>
+                <a:effectLst/>
+                <a:latin typeface="Arial" panose="020B0604020202020204" pitchFamily="34" charset="0"/>
+                <a:cs typeface="Arial" panose="020B0604020202020204" pitchFamily="34" charset="0"/>
+              </a:rPr>
+              <a:t>but what does custom transcriptome assembly entail?</a:t>
+            </a:r>
+            <a:endParaRPr lang="en-US" sz="2200" dirty="0">
+              <a:latin typeface="Arial" panose="020B0604020202020204" pitchFamily="34" charset="0"/>
+              <a:cs typeface="Arial" panose="020B0604020202020204" pitchFamily="34" charset="0"/>
+            </a:endParaRPr>
+          </a:p>
+        </p:txBody>
+      </p:sp>
+      <p:sp>
+        <p:nvSpPr>
+          <p:cNvPr id="3" name="Content Placeholder 2">
+            <a:extLst>
+              <a:ext uri="{FF2B5EF4-FFF2-40B4-BE49-F238E27FC236}">
+                <a16:creationId xmlns:a16="http://schemas.microsoft.com/office/drawing/2014/main" id="{4451B0C9-4732-5A99-902A-E6837EB7CF8E}"/>
+              </a:ext>
+            </a:extLst>
+          </p:cNvPr>
+          <p:cNvSpPr>
+            <a:spLocks noGrp="1"/>
+          </p:cNvSpPr>
+          <p:nvPr>
+            <p:ph idx="1"/>
+          </p:nvPr>
+        </p:nvSpPr>
+        <p:spPr>
+          <a:xfrm>
+            <a:off x="0" y="794657"/>
+            <a:ext cx="12192000" cy="5159829"/>
+          </a:xfrm>
+        </p:spPr>
+        <p:txBody>
+          <a:bodyPr>
+            <a:normAutofit/>
+          </a:bodyPr>
+          <a:lstStyle/>
+          <a:p>
+            <a:r>
+              <a:rPr lang="en-US" sz="2000" dirty="0">
+                <a:latin typeface="Arial" panose="020B0604020202020204" pitchFamily="34" charset="0"/>
+                <a:cs typeface="Arial" panose="020B0604020202020204" pitchFamily="34" charset="0"/>
+              </a:rPr>
+              <a:t>Something</a:t>
+            </a:r>
+          </a:p>
+          <a:p>
+            <a:r>
+              <a:rPr lang="en-US" sz="2000" dirty="0">
+                <a:latin typeface="Arial" panose="020B0604020202020204" pitchFamily="34" charset="0"/>
+                <a:cs typeface="Arial" panose="020B0604020202020204" pitchFamily="34" charset="0"/>
+              </a:rPr>
+              <a:t>Something</a:t>
+            </a:r>
+          </a:p>
+          <a:p>
+            <a:r>
+              <a:rPr lang="en-US" sz="2000" dirty="0">
+                <a:latin typeface="Arial" panose="020B0604020202020204" pitchFamily="34" charset="0"/>
+                <a:cs typeface="Arial" panose="020B0604020202020204" pitchFamily="34" charset="0"/>
+              </a:rPr>
+              <a:t>Something</a:t>
+            </a:r>
+          </a:p>
+        </p:txBody>
+      </p:sp>
+      <p:sp>
+        <p:nvSpPr>
+          <p:cNvPr id="4" name="Title 1">
+            <a:extLst>
+              <a:ext uri="{FF2B5EF4-FFF2-40B4-BE49-F238E27FC236}">
+                <a16:creationId xmlns:a16="http://schemas.microsoft.com/office/drawing/2014/main" id="{7B6654B2-C663-080E-50DC-8A5669E9B9EC}"/>
+              </a:ext>
+            </a:extLst>
+          </p:cNvPr>
+          <p:cNvSpPr txBox="1">
+            <a:spLocks/>
+          </p:cNvSpPr>
+          <p:nvPr/>
+        </p:nvSpPr>
+        <p:spPr>
+          <a:xfrm>
+            <a:off x="0" y="-1"/>
+            <a:ext cx="12192000" cy="794657"/>
+          </a:xfrm>
+          <a:prstGeom prst="rect">
+            <a:avLst/>
+          </a:prstGeom>
+        </p:spPr>
+        <p:txBody>
+          <a:bodyPr vert="horz" lIns="91440" tIns="45720" rIns="91440" bIns="45720" rtlCol="0" anchor="ctr">
+            <a:noAutofit/>
+          </a:bodyPr>
+          <a:lstStyle>
+            <a:lvl1pPr algn="l" defTabSz="914400" rtl="0" eaLnBrk="1" latinLnBrk="0" hangingPunct="1">
+              <a:lnSpc>
+                <a:spcPct val="90000"/>
+              </a:lnSpc>
+              <a:spcBef>
+                <a:spcPct val="0"/>
+              </a:spcBef>
+              <a:buNone/>
+              <a:defRPr sz="4400" kern="1200">
+                <a:solidFill>
+                  <a:schemeClr val="tx1"/>
+                </a:solidFill>
+                <a:latin typeface="+mj-lt"/>
+                <a:ea typeface="+mj-ea"/>
+                <a:cs typeface="+mj-cs"/>
+              </a:defRPr>
+            </a:lvl1pPr>
+          </a:lstStyle>
+          <a:p>
+            <a:r>
+              <a:rPr lang="en-US" sz="2200" dirty="0">
+                <a:solidFill>
+                  <a:srgbClr val="737373"/>
+                </a:solidFill>
+                <a:latin typeface="Helvetica Neue" panose="02000503000000020004" pitchFamily="2" charset="0"/>
+              </a:rPr>
+              <a:t>Why do we need a new transcriptome assembly, and what will we do with it?</a:t>
+            </a:r>
+            <a:endParaRPr lang="en-US" sz="2200" dirty="0"/>
+          </a:p>
+        </p:txBody>
+      </p:sp>
+      <p:pic>
+        <p:nvPicPr>
+          <p:cNvPr id="6" name="Picture 5" descr="Diagram&#10;&#10;Description automatically generated">
+            <a:extLst>
+              <a:ext uri="{FF2B5EF4-FFF2-40B4-BE49-F238E27FC236}">
+                <a16:creationId xmlns:a16="http://schemas.microsoft.com/office/drawing/2014/main" id="{BA1B1999-8C71-8DE4-22FE-A84B7F1161DC}"/>
+              </a:ext>
+            </a:extLst>
+          </p:cNvPr>
+          <p:cNvPicPr>
+            <a:picLocks noChangeAspect="1"/>
+          </p:cNvPicPr>
+          <p:nvPr/>
+        </p:nvPicPr>
+        <p:blipFill>
+          <a:blip r:embed="rId2"/>
+          <a:stretch>
+            <a:fillRect/>
+          </a:stretch>
+        </p:blipFill>
+        <p:spPr>
+          <a:xfrm>
+            <a:off x="3408833" y="1670028"/>
+            <a:ext cx="3995175" cy="3641172"/>
+          </a:xfrm>
+          <a:prstGeom prst="rect">
+            <a:avLst/>
+          </a:prstGeom>
+        </p:spPr>
+      </p:pic>
+      <p:pic>
+        <p:nvPicPr>
+          <p:cNvPr id="8" name="Picture 7" descr="Diagram&#10;&#10;Description automatically generated">
+            <a:extLst>
+              <a:ext uri="{FF2B5EF4-FFF2-40B4-BE49-F238E27FC236}">
+                <a16:creationId xmlns:a16="http://schemas.microsoft.com/office/drawing/2014/main" id="{4B0800D2-E003-BFA6-7049-15BFFD55CEC9}"/>
+              </a:ext>
+            </a:extLst>
+          </p:cNvPr>
+          <p:cNvPicPr>
+            <a:picLocks noChangeAspect="1"/>
+          </p:cNvPicPr>
+          <p:nvPr/>
+        </p:nvPicPr>
+        <p:blipFill>
+          <a:blip r:embed="rId3"/>
+          <a:stretch>
+            <a:fillRect/>
+          </a:stretch>
+        </p:blipFill>
+        <p:spPr>
+          <a:xfrm>
+            <a:off x="7404008" y="1655656"/>
+            <a:ext cx="4210096" cy="3546687"/>
+          </a:xfrm>
+          <a:prstGeom prst="rect">
+            <a:avLst/>
+          </a:prstGeom>
+        </p:spPr>
+      </p:pic>
+    </p:spTree>
+    <p:extLst>
+      <p:ext uri="{BB962C8B-B14F-4D97-AF65-F5344CB8AC3E}">
+        <p14:creationId xmlns:p14="http://schemas.microsoft.com/office/powerpoint/2010/main" val="512928482"/>
+      </p:ext>
+    </p:extLst>
+  </p:cSld>
+  <p:clrMapOvr>
+    <a:masterClrMapping/>
+  </p:clrMapOvr>
+</p:sld>
+</file>
+
+<file path=ppt/slides/slide8.xml><?xml version="1.0" encoding="utf-8"?>
 <p:sld xmlns:a="http://schemas.openxmlformats.org/drawingml/2006/main" xmlns:r="http://schemas.openxmlformats.org/officeDocument/2006/relationships" xmlns:p="http://schemas.openxmlformats.org/presentationml/2006/main">
   <p:cSld>
     <p:spTree>
@@ -6437,7 +6487,7 @@
 </p:sld>
 </file>
 
-<file path=ppt/slides/slide8.xml><?xml version="1.0" encoding="utf-8"?>
+<file path=ppt/slides/slide9.xml><?xml version="1.0" encoding="utf-8"?>
 <p:sld xmlns:a="http://schemas.openxmlformats.org/drawingml/2006/main" xmlns:r="http://schemas.openxmlformats.org/officeDocument/2006/relationships" xmlns:p="http://schemas.openxmlformats.org/presentationml/2006/main">
   <p:cSld>
     <p:spTree>

</xml_diff>